<commit_message>
authorship change to Lin Lab
</commit_message>
<xml_diff>
--- a/Instructions_for_SLPtool.pptx
+++ b/Instructions_for_SLPtool.pptx
@@ -3396,9 +3396,10 @@
               <a:t>Xiaoyu</a:t>
             </a:r>
             <a:r>
-              <a:rPr lang="en-US" sz="3600" dirty="0"/>
-              <a:t> Tong</a:t>
-            </a:r>
+              <a:rPr lang="en-US" sz="3600"/>
+              <a:t> Tong, Lin Lab</a:t>
+            </a:r>
+            <a:endParaRPr lang="en-US" sz="3600" dirty="0"/>
           </a:p>
           <a:p>
             <a:r>

</xml_diff>